<commit_message>
push about Event Loop
</commit_message>
<xml_diff>
--- a/javascript_for_me.pptx
+++ b/javascript_for_me.pptx
@@ -209,7 +209,7 @@
           <a:p>
             <a:fld id="{A0D61E68-9DFE-4964-BBDE-D0077A01C9F1}" type="datetimeFigureOut">
               <a:rPr lang="zh-TW" altLang="en-US" smtClean="0"/>
-              <a:t>2025/1/10</a:t>
+              <a:t>2025/1/24</a:t>
             </a:fld>
             <a:endParaRPr lang="zh-TW" altLang="en-US"/>
           </a:p>
@@ -623,7 +623,7 @@
           <a:p>
             <a:fld id="{5C5B5AF6-9BFF-4FDF-835B-9095DB9C394C}" type="datetimeFigureOut">
               <a:rPr lang="zh-TW" altLang="en-US" smtClean="0"/>
-              <a:t>2025/1/10</a:t>
+              <a:t>2025/1/24</a:t>
             </a:fld>
             <a:endParaRPr lang="zh-TW" altLang="en-US"/>
           </a:p>
@@ -821,7 +821,7 @@
           <a:p>
             <a:fld id="{5C5B5AF6-9BFF-4FDF-835B-9095DB9C394C}" type="datetimeFigureOut">
               <a:rPr lang="zh-TW" altLang="en-US" smtClean="0"/>
-              <a:t>2025/1/10</a:t>
+              <a:t>2025/1/24</a:t>
             </a:fld>
             <a:endParaRPr lang="zh-TW" altLang="en-US"/>
           </a:p>
@@ -1029,7 +1029,7 @@
           <a:p>
             <a:fld id="{5C5B5AF6-9BFF-4FDF-835B-9095DB9C394C}" type="datetimeFigureOut">
               <a:rPr lang="zh-TW" altLang="en-US" smtClean="0"/>
-              <a:t>2025/1/10</a:t>
+              <a:t>2025/1/24</a:t>
             </a:fld>
             <a:endParaRPr lang="zh-TW" altLang="en-US"/>
           </a:p>
@@ -1227,7 +1227,7 @@
           <a:p>
             <a:fld id="{5C5B5AF6-9BFF-4FDF-835B-9095DB9C394C}" type="datetimeFigureOut">
               <a:rPr lang="zh-TW" altLang="en-US" smtClean="0"/>
-              <a:t>2025/1/10</a:t>
+              <a:t>2025/1/24</a:t>
             </a:fld>
             <a:endParaRPr lang="zh-TW" altLang="en-US"/>
           </a:p>
@@ -1502,7 +1502,7 @@
           <a:p>
             <a:fld id="{5C5B5AF6-9BFF-4FDF-835B-9095DB9C394C}" type="datetimeFigureOut">
               <a:rPr lang="zh-TW" altLang="en-US" smtClean="0"/>
-              <a:t>2025/1/10</a:t>
+              <a:t>2025/1/24</a:t>
             </a:fld>
             <a:endParaRPr lang="zh-TW" altLang="en-US"/>
           </a:p>
@@ -1767,7 +1767,7 @@
           <a:p>
             <a:fld id="{5C5B5AF6-9BFF-4FDF-835B-9095DB9C394C}" type="datetimeFigureOut">
               <a:rPr lang="zh-TW" altLang="en-US" smtClean="0"/>
-              <a:t>2025/1/10</a:t>
+              <a:t>2025/1/24</a:t>
             </a:fld>
             <a:endParaRPr lang="zh-TW" altLang="en-US"/>
           </a:p>
@@ -2179,7 +2179,7 @@
           <a:p>
             <a:fld id="{5C5B5AF6-9BFF-4FDF-835B-9095DB9C394C}" type="datetimeFigureOut">
               <a:rPr lang="zh-TW" altLang="en-US" smtClean="0"/>
-              <a:t>2025/1/10</a:t>
+              <a:t>2025/1/24</a:t>
             </a:fld>
             <a:endParaRPr lang="zh-TW" altLang="en-US"/>
           </a:p>
@@ -2320,7 +2320,7 @@
           <a:p>
             <a:fld id="{5C5B5AF6-9BFF-4FDF-835B-9095DB9C394C}" type="datetimeFigureOut">
               <a:rPr lang="zh-TW" altLang="en-US" smtClean="0"/>
-              <a:t>2025/1/10</a:t>
+              <a:t>2025/1/24</a:t>
             </a:fld>
             <a:endParaRPr lang="zh-TW" altLang="en-US"/>
           </a:p>
@@ -2433,7 +2433,7 @@
           <a:p>
             <a:fld id="{5C5B5AF6-9BFF-4FDF-835B-9095DB9C394C}" type="datetimeFigureOut">
               <a:rPr lang="zh-TW" altLang="en-US" smtClean="0"/>
-              <a:t>2025/1/10</a:t>
+              <a:t>2025/1/24</a:t>
             </a:fld>
             <a:endParaRPr lang="zh-TW" altLang="en-US"/>
           </a:p>
@@ -2744,7 +2744,7 @@
           <a:p>
             <a:fld id="{5C5B5AF6-9BFF-4FDF-835B-9095DB9C394C}" type="datetimeFigureOut">
               <a:rPr lang="zh-TW" altLang="en-US" smtClean="0"/>
-              <a:t>2025/1/10</a:t>
+              <a:t>2025/1/24</a:t>
             </a:fld>
             <a:endParaRPr lang="zh-TW" altLang="en-US"/>
           </a:p>
@@ -3032,7 +3032,7 @@
           <a:p>
             <a:fld id="{5C5B5AF6-9BFF-4FDF-835B-9095DB9C394C}" type="datetimeFigureOut">
               <a:rPr lang="zh-TW" altLang="en-US" smtClean="0"/>
-              <a:t>2025/1/10</a:t>
+              <a:t>2025/1/24</a:t>
             </a:fld>
             <a:endParaRPr lang="zh-TW" altLang="en-US"/>
           </a:p>
@@ -3273,7 +3273,7 @@
           <a:p>
             <a:fld id="{5C5B5AF6-9BFF-4FDF-835B-9095DB9C394C}" type="datetimeFigureOut">
               <a:rPr lang="zh-TW" altLang="en-US" smtClean="0"/>
-              <a:t>2025/1/10</a:t>
+              <a:t>2025/1/24</a:t>
             </a:fld>
             <a:endParaRPr lang="zh-TW" altLang="en-US"/>
           </a:p>
@@ -10101,6 +10101,295 @@
           </p:sp>
         </p:grpSp>
       </p:grpSp>
+      <p:grpSp>
+        <p:nvGrpSpPr>
+          <p:cNvPr id="2" name="群組 1">
+            <a:extLst>
+              <a:ext uri="{FF2B5EF4-FFF2-40B4-BE49-F238E27FC236}">
+                <a16:creationId xmlns:a16="http://schemas.microsoft.com/office/drawing/2014/main" id="{5D741B49-1FBF-0CCB-BD86-0AD34D010AF6}"/>
+              </a:ext>
+            </a:extLst>
+          </p:cNvPr>
+          <p:cNvGrpSpPr/>
+          <p:nvPr/>
+        </p:nvGrpSpPr>
+        <p:grpSpPr>
+          <a:xfrm>
+            <a:off x="111160" y="53700"/>
+            <a:ext cx="6773008" cy="860178"/>
+            <a:chOff x="111160" y="53700"/>
+            <a:chExt cx="6773008" cy="860178"/>
+          </a:xfrm>
+        </p:grpSpPr>
+        <p:sp>
+          <p:nvSpPr>
+            <p:cNvPr id="3" name="文字方塊 2">
+              <a:extLst>
+                <a:ext uri="{FF2B5EF4-FFF2-40B4-BE49-F238E27FC236}">
+                  <a16:creationId xmlns:a16="http://schemas.microsoft.com/office/drawing/2014/main" id="{2FB846D8-1701-5394-5741-AD4167869026}"/>
+                </a:ext>
+              </a:extLst>
+            </p:cNvPr>
+            <p:cNvSpPr txBox="1"/>
+            <p:nvPr/>
+          </p:nvSpPr>
+          <p:spPr>
+            <a:xfrm>
+              <a:off x="111160" y="53700"/>
+              <a:ext cx="6773008" cy="830997"/>
+            </a:xfrm>
+            <a:prstGeom prst="rect">
+              <a:avLst/>
+            </a:prstGeom>
+            <a:solidFill>
+              <a:schemeClr val="tx1"/>
+            </a:solidFill>
+          </p:spPr>
+          <p:txBody>
+            <a:bodyPr wrap="none" rtlCol="0">
+              <a:spAutoFit/>
+            </a:bodyPr>
+            <a:lstStyle/>
+            <a:p>
+              <a:r>
+                <a:rPr lang="en-US" altLang="zh-TW" sz="4800" dirty="0">
+                  <a:solidFill>
+                    <a:schemeClr val="bg1"/>
+                  </a:solidFill>
+                  <a:latin typeface="HGPSoeiKakupoptai" panose="040B0A00000000000000" pitchFamily="82" charset="-128"/>
+                  <a:ea typeface="HGPSoeiKakupoptai" panose="040B0A00000000000000" pitchFamily="82" charset="-128"/>
+                  <a:cs typeface="ADLaM Display" panose="02010000000000000000" pitchFamily="2" charset="0"/>
+                </a:rPr>
+                <a:t>JavaScript Event Loop</a:t>
+              </a:r>
+            </a:p>
+          </p:txBody>
+        </p:sp>
+        <p:cxnSp>
+          <p:nvCxnSpPr>
+            <p:cNvPr id="4" name="直線接點 3">
+              <a:extLst>
+                <a:ext uri="{FF2B5EF4-FFF2-40B4-BE49-F238E27FC236}">
+                  <a16:creationId xmlns:a16="http://schemas.microsoft.com/office/drawing/2014/main" id="{33C3EE17-33A6-343C-301C-4DAD29876850}"/>
+                </a:ext>
+              </a:extLst>
+            </p:cNvPr>
+            <p:cNvCxnSpPr>
+              <a:cxnSpLocks/>
+            </p:cNvCxnSpPr>
+            <p:nvPr/>
+          </p:nvCxnSpPr>
+          <p:spPr>
+            <a:xfrm>
+              <a:off x="175095" y="913878"/>
+              <a:ext cx="6502796" cy="0"/>
+            </a:xfrm>
+            <a:prstGeom prst="line">
+              <a:avLst/>
+            </a:prstGeom>
+            <a:ln w="57150">
+              <a:solidFill>
+                <a:schemeClr val="bg1">
+                  <a:lumMod val="95000"/>
+                </a:schemeClr>
+              </a:solidFill>
+              <a:headEnd type="none" w="med" len="med"/>
+              <a:tailEnd type="none" w="med" len="med"/>
+            </a:ln>
+          </p:spPr>
+          <p:style>
+            <a:lnRef idx="2">
+              <a:schemeClr val="accent1"/>
+            </a:lnRef>
+            <a:fillRef idx="0">
+              <a:schemeClr val="accent1"/>
+            </a:fillRef>
+            <a:effectRef idx="1">
+              <a:schemeClr val="accent1"/>
+            </a:effectRef>
+            <a:fontRef idx="minor">
+              <a:schemeClr val="tx1"/>
+            </a:fontRef>
+          </p:style>
+        </p:cxnSp>
+      </p:grpSp>
+      <p:sp>
+        <p:nvSpPr>
+          <p:cNvPr id="5" name="文字方塊 4">
+            <a:extLst>
+              <a:ext uri="{FF2B5EF4-FFF2-40B4-BE49-F238E27FC236}">
+                <a16:creationId xmlns:a16="http://schemas.microsoft.com/office/drawing/2014/main" id="{A4D679C0-CE9C-4454-AD23-D46B259BD16E}"/>
+              </a:ext>
+            </a:extLst>
+          </p:cNvPr>
+          <p:cNvSpPr txBox="1"/>
+          <p:nvPr/>
+        </p:nvSpPr>
+        <p:spPr>
+          <a:xfrm>
+            <a:off x="2177249" y="1000926"/>
+            <a:ext cx="10006265" cy="461665"/>
+          </a:xfrm>
+          <a:prstGeom prst="rect">
+            <a:avLst/>
+          </a:prstGeom>
+          <a:noFill/>
+          <a:ln>
+            <a:noFill/>
+          </a:ln>
+        </p:spPr>
+        <p:txBody>
+          <a:bodyPr wrap="none" rtlCol="0">
+            <a:spAutoFit/>
+          </a:bodyPr>
+          <a:lstStyle>
+            <a:defPPr>
+              <a:defRPr lang="zh-TW"/>
+            </a:defPPr>
+            <a:lvl1pPr>
+              <a:defRPr sz="4800">
+                <a:solidFill>
+                  <a:schemeClr val="bg1"/>
+                </a:solidFill>
+                <a:latin typeface="ADLaM Display" panose="02010000000000000000" pitchFamily="2" charset="0"/>
+                <a:ea typeface="ADLaM Display" panose="02010000000000000000" pitchFamily="2" charset="0"/>
+                <a:cs typeface="ADLaM Display" panose="02010000000000000000" pitchFamily="2" charset="0"/>
+              </a:defRPr>
+            </a:lvl1pPr>
+          </a:lstStyle>
+          <a:p>
+            <a:r>
+              <a:rPr lang="en-US" altLang="zh-TW" sz="2400" dirty="0">
+                <a:latin typeface="HGPSoeiKakupoptai" panose="040B0A00000000000000" pitchFamily="82" charset="-128"/>
+                <a:ea typeface="HGPSoeiKakupoptai" panose="040B0A00000000000000" pitchFamily="82" charset="-128"/>
+              </a:rPr>
+              <a:t>For enabling non-blocking execution despite being single-threaded.</a:t>
+            </a:r>
+            <a:endParaRPr lang="zh-TW" altLang="en-US" sz="2400" dirty="0">
+              <a:latin typeface="HGPSoeiKakupoptai" panose="040B0A00000000000000" pitchFamily="82" charset="-128"/>
+              <a:ea typeface="HGPSoeiKakupoptai" panose="040B0A00000000000000" pitchFamily="82" charset="-128"/>
+            </a:endParaRPr>
+          </a:p>
+        </p:txBody>
+      </p:sp>
+      <p:sp>
+        <p:nvSpPr>
+          <p:cNvPr id="18" name="文字方塊 17">
+            <a:extLst>
+              <a:ext uri="{FF2B5EF4-FFF2-40B4-BE49-F238E27FC236}">
+                <a16:creationId xmlns:a16="http://schemas.microsoft.com/office/drawing/2014/main" id="{9D686AF7-471A-E48D-CE01-F860E286A432}"/>
+              </a:ext>
+            </a:extLst>
+          </p:cNvPr>
+          <p:cNvSpPr txBox="1"/>
+          <p:nvPr/>
+        </p:nvSpPr>
+        <p:spPr>
+          <a:xfrm>
+            <a:off x="2177249" y="1657581"/>
+            <a:ext cx="2553904" cy="707886"/>
+          </a:xfrm>
+          <a:prstGeom prst="rect">
+            <a:avLst/>
+          </a:prstGeom>
+          <a:noFill/>
+          <a:ln>
+            <a:noFill/>
+          </a:ln>
+        </p:spPr>
+        <p:txBody>
+          <a:bodyPr wrap="none" rtlCol="0">
+            <a:spAutoFit/>
+          </a:bodyPr>
+          <a:lstStyle>
+            <a:defPPr>
+              <a:defRPr lang="zh-TW"/>
+            </a:defPPr>
+            <a:lvl1pPr>
+              <a:defRPr sz="4800">
+                <a:solidFill>
+                  <a:schemeClr val="bg1"/>
+                </a:solidFill>
+                <a:latin typeface="ADLaM Display" panose="02010000000000000000" pitchFamily="2" charset="0"/>
+                <a:ea typeface="ADLaM Display" panose="02010000000000000000" pitchFamily="2" charset="0"/>
+                <a:cs typeface="ADLaM Display" panose="02010000000000000000" pitchFamily="2" charset="0"/>
+              </a:defRPr>
+            </a:lvl1pPr>
+          </a:lstStyle>
+          <a:p>
+            <a:r>
+              <a:rPr lang="en-US" altLang="zh-TW" sz="4000" dirty="0">
+                <a:latin typeface="HGPSoeiKakupoptai" panose="040B0A00000000000000" pitchFamily="82" charset="-128"/>
+                <a:ea typeface="HGPSoeiKakupoptai" panose="040B0A00000000000000" pitchFamily="82" charset="-128"/>
+              </a:rPr>
+              <a:t>Call Stack</a:t>
+            </a:r>
+            <a:endParaRPr lang="zh-TW" altLang="en-US" sz="4000" dirty="0">
+              <a:latin typeface="HGPSoeiKakupoptai" panose="040B0A00000000000000" pitchFamily="82" charset="-128"/>
+              <a:ea typeface="HGPSoeiKakupoptai" panose="040B0A00000000000000" pitchFamily="82" charset="-128"/>
+            </a:endParaRPr>
+          </a:p>
+        </p:txBody>
+      </p:sp>
+      <p:sp>
+        <p:nvSpPr>
+          <p:cNvPr id="19" name="文字方塊 18">
+            <a:extLst>
+              <a:ext uri="{FF2B5EF4-FFF2-40B4-BE49-F238E27FC236}">
+                <a16:creationId xmlns:a16="http://schemas.microsoft.com/office/drawing/2014/main" id="{874EAFEA-C99D-4016-37F2-C48FC79F08A8}"/>
+              </a:ext>
+            </a:extLst>
+          </p:cNvPr>
+          <p:cNvSpPr txBox="1"/>
+          <p:nvPr/>
+        </p:nvSpPr>
+        <p:spPr>
+          <a:xfrm>
+            <a:off x="2177249" y="4067122"/>
+            <a:ext cx="2882520" cy="707886"/>
+          </a:xfrm>
+          <a:prstGeom prst="rect">
+            <a:avLst/>
+          </a:prstGeom>
+          <a:noFill/>
+          <a:ln>
+            <a:noFill/>
+          </a:ln>
+        </p:spPr>
+        <p:txBody>
+          <a:bodyPr wrap="none" rtlCol="0">
+            <a:spAutoFit/>
+          </a:bodyPr>
+          <a:lstStyle>
+            <a:defPPr>
+              <a:defRPr lang="zh-TW"/>
+            </a:defPPr>
+            <a:lvl1pPr>
+              <a:defRPr sz="4800">
+                <a:solidFill>
+                  <a:schemeClr val="bg1"/>
+                </a:solidFill>
+                <a:latin typeface="ADLaM Display" panose="02010000000000000000" pitchFamily="2" charset="0"/>
+                <a:ea typeface="ADLaM Display" panose="02010000000000000000" pitchFamily="2" charset="0"/>
+                <a:cs typeface="ADLaM Display" panose="02010000000000000000" pitchFamily="2" charset="0"/>
+              </a:defRPr>
+            </a:lvl1pPr>
+          </a:lstStyle>
+          <a:p>
+            <a:r>
+              <a:rPr lang="en-US" altLang="zh-TW" sz="4000">
+                <a:latin typeface="HGPSoeiKakupoptai" panose="040B0A00000000000000" pitchFamily="82" charset="-128"/>
+                <a:ea typeface="HGPSoeiKakupoptai" panose="040B0A00000000000000" pitchFamily="82" charset="-128"/>
+              </a:rPr>
+              <a:t>Task Queue</a:t>
+            </a:r>
+            <a:endParaRPr lang="zh-TW" altLang="en-US" sz="4000" dirty="0">
+              <a:latin typeface="HGPSoeiKakupoptai" panose="040B0A00000000000000" pitchFamily="82" charset="-128"/>
+              <a:ea typeface="HGPSoeiKakupoptai" panose="040B0A00000000000000" pitchFamily="82" charset="-128"/>
+            </a:endParaRPr>
+          </a:p>
+        </p:txBody>
+      </p:sp>
     </p:spTree>
     <p:extLst>
       <p:ext uri="{BB962C8B-B14F-4D97-AF65-F5344CB8AC3E}">

</xml_diff>